<commit_message>
corrected mistake on lecture 2, added slide for 2 counter block reason
</commit_message>
<xml_diff>
--- a/Lectures/Slides/L2.pptx
+++ b/Lectures/Slides/L2.pptx
@@ -5,7 +5,7 @@
     <p:sldMasterId id="2147483648" r:id="rId1"/>
   </p:sldMasterIdLst>
   <p:notesMasterIdLst>
-    <p:notesMasterId r:id="rId30"/>
+    <p:notesMasterId r:id="rId31"/>
   </p:notesMasterIdLst>
   <p:sldIdLst>
     <p:sldId id="256" r:id="rId2"/>
@@ -32,10 +32,11 @@
     <p:sldId id="291" r:id="rId23"/>
     <p:sldId id="292" r:id="rId24"/>
     <p:sldId id="295" r:id="rId25"/>
-    <p:sldId id="293" r:id="rId26"/>
-    <p:sldId id="294" r:id="rId27"/>
-    <p:sldId id="269" r:id="rId28"/>
-    <p:sldId id="270" r:id="rId29"/>
+    <p:sldId id="296" r:id="rId26"/>
+    <p:sldId id="293" r:id="rId27"/>
+    <p:sldId id="294" r:id="rId28"/>
+    <p:sldId id="269" r:id="rId29"/>
+    <p:sldId id="270" r:id="rId30"/>
   </p:sldIdLst>
   <p:sldSz cx="12192000" cy="6858000"/>
   <p:notesSz cx="6858000" cy="9144000"/>
@@ -273,7 +274,7 @@
       <p15:sldGuideLst xmlns:p15="http://schemas.microsoft.com/office/powerpoint/2012/main"/>
     </p:ext>
     <p:ext uri="http://customooxmlschemas.google.com/">
-      <go:slidesCustomData xmlns="" xmlns:mc="http://schemas.openxmlformats.org/markup-compatibility/2006" xmlns:mv="urn:schemas-microsoft-com:mac:vml" xmlns:c="http://schemas.openxmlformats.org/drawingml/2006/chart" xmlns:dgm="http://schemas.openxmlformats.org/drawingml/2006/diagram" xmlns:o="urn:schemas-microsoft-com:office:office" xmlns:v="urn:schemas-microsoft-com:vml" xmlns:pvml="urn:schemas-microsoft-com:office:powerpoint" xmlns:com="http://schemas.openxmlformats.org/drawingml/2006/compatibility" xmlns:p14="http://schemas.microsoft.com/office/powerpoint/2010/main" xmlns:p15="http://schemas.microsoft.com/office/powerpoint/2012/main" xmlns:ahyp="http://schemas.microsoft.com/office/drawing/2018/hyperlinkcolor" xmlns:go="http://customooxmlschemas.google.com/" r:id="rId31" roundtripDataSignature="AMtx7mjKkk5wOoQj6sDPPETbbKgHU96Dzg=="/>
+      <go:slidesCustomData xmlns="" xmlns:mc="http://schemas.openxmlformats.org/markup-compatibility/2006" xmlns:mv="urn:schemas-microsoft-com:mac:vml" xmlns:c="http://schemas.openxmlformats.org/drawingml/2006/chart" xmlns:dgm="http://schemas.openxmlformats.org/drawingml/2006/diagram" xmlns:o="urn:schemas-microsoft-com:office:office" xmlns:v="urn:schemas-microsoft-com:vml" xmlns:pvml="urn:schemas-microsoft-com:office:powerpoint" xmlns:com="http://schemas.openxmlformats.org/drawingml/2006/compatibility" xmlns:p14="http://schemas.microsoft.com/office/powerpoint/2010/main" xmlns:p15="http://schemas.microsoft.com/office/powerpoint/2012/main" xmlns:ahyp="http://schemas.microsoft.com/office/drawing/2018/hyperlinkcolor" xmlns:go="http://customooxmlschemas.google.com/" r:id="rId32" roundtripDataSignature="AMtx7mjKkk5wOoQj6sDPPETbbKgHU96Dzg=="/>
     </p:ext>
   </p:extLst>
 </p:presentation>
@@ -1783,6 +1784,45 @@
               </a:spcAft>
               <a:buNone/>
             </a:pPr>
+            <a:r>
+              <a:rPr lang="en-US" dirty="0"/>
+              <a:t>Well I hope that most of your classes have been </a:t>
+            </a:r>
+            <a:r>
+              <a:rPr lang="en-US" dirty="0" err="1"/>
+              <a:t>cancled</a:t>
+            </a:r>
+            <a:r>
+              <a:rPr lang="en-US" dirty="0"/>
+              <a:t> or are on Zoom</a:t>
+            </a:r>
+          </a:p>
+          <a:p>
+            <a:pPr marL="0" lvl="0" indent="0" algn="l" rtl="0">
+              <a:spcBef>
+                <a:spcPts val="0"/>
+              </a:spcBef>
+              <a:spcAft>
+                <a:spcPts val="0"/>
+              </a:spcAft>
+              <a:buNone/>
+            </a:pPr>
+            <a:endParaRPr lang="en-US" dirty="0"/>
+          </a:p>
+          <a:p>
+            <a:pPr marL="0" lvl="0" indent="0" algn="l" rtl="0">
+              <a:spcBef>
+                <a:spcPts val="0"/>
+              </a:spcBef>
+              <a:spcAft>
+                <a:spcPts val="0"/>
+              </a:spcAft>
+              <a:buNone/>
+            </a:pPr>
+            <a:r>
+              <a:rPr lang="en-US" dirty="0"/>
+              <a:t>Did all of you get my Canvas email or do I need to it through email? Or announcements?</a:t>
+            </a:r>
             <a:endParaRPr dirty="0"/>
           </a:p>
         </p:txBody>
@@ -4999,6 +5039,151 @@
         <p:cNvPr id="1" name="Shape 114">
           <a:extLst>
             <a:ext uri="{FF2B5EF4-FFF2-40B4-BE49-F238E27FC236}">
+              <a16:creationId xmlns:a16="http://schemas.microsoft.com/office/drawing/2014/main" id="{69857DE6-DF8B-D8B6-B80A-D4FFA47EBC2B}"/>
+            </a:ext>
+          </a:extLst>
+        </p:cNvPr>
+        <p:cNvGrpSpPr/>
+        <p:nvPr/>
+      </p:nvGrpSpPr>
+      <p:grpSpPr>
+        <a:xfrm>
+          <a:off x="0" y="0"/>
+          <a:ext cx="0" cy="0"/>
+          <a:chOff x="0" y="0"/>
+          <a:chExt cx="0" cy="0"/>
+        </a:xfrm>
+      </p:grpSpPr>
+      <p:sp>
+        <p:nvSpPr>
+          <p:cNvPr id="115" name="Google Shape;115;p29:notes">
+            <a:extLst>
+              <a:ext uri="{FF2B5EF4-FFF2-40B4-BE49-F238E27FC236}">
+                <a16:creationId xmlns:a16="http://schemas.microsoft.com/office/drawing/2014/main" id="{DA53D2C1-BC7D-1078-FBB3-A7432099885C}"/>
+              </a:ext>
+            </a:extLst>
+          </p:cNvPr>
+          <p:cNvSpPr txBox="1">
+            <a:spLocks noGrp="1"/>
+          </p:cNvSpPr>
+          <p:nvPr>
+            <p:ph type="body" idx="1"/>
+          </p:nvPr>
+        </p:nvSpPr>
+        <p:spPr>
+          <a:xfrm>
+            <a:off x="685800" y="4400550"/>
+            <a:ext cx="5486400" cy="3600450"/>
+          </a:xfrm>
+          <a:prstGeom prst="rect">
+            <a:avLst/>
+          </a:prstGeom>
+          <a:noFill/>
+          <a:ln>
+            <a:noFill/>
+          </a:ln>
+        </p:spPr>
+        <p:txBody>
+          <a:bodyPr spcFirstLastPara="1" wrap="square" lIns="91425" tIns="45700" rIns="91425" bIns="45700" anchor="t" anchorCtr="0">
+            <a:noAutofit/>
+          </a:bodyPr>
+          <a:lstStyle/>
+          <a:p>
+            <a:pPr marL="0" lvl="0" indent="0" algn="l" rtl="0">
+              <a:lnSpc>
+                <a:spcPct val="100000"/>
+              </a:lnSpc>
+              <a:spcBef>
+                <a:spcPts val="0"/>
+              </a:spcBef>
+              <a:spcAft>
+                <a:spcPts val="0"/>
+              </a:spcAft>
+              <a:buSzPts val="1400"/>
+              <a:buNone/>
+            </a:pPr>
+            <a:endParaRPr/>
+          </a:p>
+        </p:txBody>
+      </p:sp>
+      <p:sp>
+        <p:nvSpPr>
+          <p:cNvPr id="116" name="Google Shape;116;p29:notes">
+            <a:extLst>
+              <a:ext uri="{FF2B5EF4-FFF2-40B4-BE49-F238E27FC236}">
+                <a16:creationId xmlns:a16="http://schemas.microsoft.com/office/drawing/2014/main" id="{90808667-3B3A-7BDA-EA07-6665024B16BA}"/>
+              </a:ext>
+            </a:extLst>
+          </p:cNvPr>
+          <p:cNvSpPr>
+            <a:spLocks noGrp="1" noRot="1" noChangeAspect="1"/>
+          </p:cNvSpPr>
+          <p:nvPr>
+            <p:ph type="sldImg" idx="2"/>
+          </p:nvPr>
+        </p:nvSpPr>
+        <p:spPr>
+          <a:xfrm>
+            <a:off x="685800" y="1143000"/>
+            <a:ext cx="5486400" cy="3086100"/>
+          </a:xfrm>
+          <a:custGeom>
+            <a:avLst/>
+            <a:gdLst/>
+            <a:ahLst/>
+            <a:cxnLst/>
+            <a:rect l="l" t="t" r="r" b="b"/>
+            <a:pathLst>
+              <a:path w="120000" h="120000" extrusionOk="0">
+                <a:moveTo>
+                  <a:pt x="0" y="0"/>
+                </a:moveTo>
+                <a:lnTo>
+                  <a:pt x="120000" y="0"/>
+                </a:lnTo>
+                <a:lnTo>
+                  <a:pt x="120000" y="120000"/>
+                </a:lnTo>
+                <a:lnTo>
+                  <a:pt x="0" y="120000"/>
+                </a:lnTo>
+                <a:close/>
+              </a:path>
+            </a:pathLst>
+          </a:custGeom>
+          <a:noFill/>
+          <a:ln w="12700" cap="flat" cmpd="sng">
+            <a:solidFill>
+              <a:srgbClr val="000000"/>
+            </a:solidFill>
+            <a:prstDash val="solid"/>
+            <a:round/>
+            <a:headEnd type="none" w="sm" len="sm"/>
+            <a:tailEnd type="none" w="sm" len="sm"/>
+          </a:ln>
+        </p:spPr>
+      </p:sp>
+    </p:spTree>
+    <p:extLst>
+      <p:ext uri="{BB962C8B-B14F-4D97-AF65-F5344CB8AC3E}">
+        <p14:creationId xmlns:p14="http://schemas.microsoft.com/office/powerpoint/2010/main" val="2377347234"/>
+      </p:ext>
+    </p:extLst>
+  </p:cSld>
+  <p:clrMapOvr>
+    <a:masterClrMapping/>
+  </p:clrMapOvr>
+</p:notes>
+</file>
+
+<file path=ppt/notesSlides/notesSlide26.xml><?xml version="1.0" encoding="utf-8"?>
+<p:notes xmlns:a="http://schemas.openxmlformats.org/drawingml/2006/main" xmlns:r="http://schemas.openxmlformats.org/officeDocument/2006/relationships" xmlns:p="http://schemas.openxmlformats.org/presentationml/2006/main" showMasterSp="0" showMasterPhAnim="0">
+  <p:cSld>
+    <p:spTree>
+      <p:nvGrpSpPr>
+        <p:cNvPr id="1" name="Shape 114">
+          <a:extLst>
+            <a:ext uri="{FF2B5EF4-FFF2-40B4-BE49-F238E27FC236}">
               <a16:creationId xmlns:a16="http://schemas.microsoft.com/office/drawing/2014/main" id="{38C5D6C7-5422-60D4-9BF9-2EAA80BE1934}"/>
             </a:ext>
           </a:extLst>
@@ -5442,7 +5627,7 @@
 </p:notes>
 </file>
 
-<file path=ppt/notesSlides/notesSlide26.xml><?xml version="1.0" encoding="utf-8"?>
+<file path=ppt/notesSlides/notesSlide27.xml><?xml version="1.0" encoding="utf-8"?>
 <p:notes xmlns:a="http://schemas.openxmlformats.org/drawingml/2006/main" xmlns:r="http://schemas.openxmlformats.org/officeDocument/2006/relationships" xmlns:p="http://schemas.openxmlformats.org/presentationml/2006/main" showMasterSp="0" showMasterPhAnim="0">
   <p:cSld>
     <p:spTree>
@@ -5587,7 +5772,7 @@
 </p:notes>
 </file>
 
-<file path=ppt/notesSlides/notesSlide27.xml><?xml version="1.0" encoding="utf-8"?>
+<file path=ppt/notesSlides/notesSlide28.xml><?xml version="1.0" encoding="utf-8"?>
 <p:notes xmlns:a="http://schemas.openxmlformats.org/drawingml/2006/main" xmlns:r="http://schemas.openxmlformats.org/officeDocument/2006/relationships" xmlns:p="http://schemas.openxmlformats.org/presentationml/2006/main" showMasterSp="0" showMasterPhAnim="0">
   <p:cSld>
     <p:spTree>
@@ -5691,7 +5876,7 @@
 </p:notes>
 </file>
 
-<file path=ppt/notesSlides/notesSlide28.xml><?xml version="1.0" encoding="utf-8"?>
+<file path=ppt/notesSlides/notesSlide29.xml><?xml version="1.0" encoding="utf-8"?>
 <p:notes xmlns:a="http://schemas.openxmlformats.org/drawingml/2006/main" xmlns:r="http://schemas.openxmlformats.org/officeDocument/2006/relationships" xmlns:p="http://schemas.openxmlformats.org/presentationml/2006/main" showMasterSp="0" showMasterPhAnim="0">
   <p:cSld>
     <p:spTree>
@@ -5866,7 +6051,7 @@
               <a:buSzPts val="1400"/>
               <a:buNone/>
             </a:pPr>
-            <a:endParaRPr/>
+            <a:endParaRPr dirty="0"/>
           </a:p>
         </p:txBody>
       </p:sp>
@@ -6287,7 +6472,7 @@
               <a:buSzPts val="1400"/>
               <a:buNone/>
             </a:pPr>
-            <a:endParaRPr/>
+            <a:endParaRPr dirty="0"/>
           </a:p>
         </p:txBody>
       </p:sp>
@@ -27088,7 +27273,7 @@
                 <a:cs typeface="Arial"/>
                 <a:sym typeface="Arial"/>
               </a:rPr>
-              <a:t>Left shifting: </a:t>
+              <a:t>Right shifting: </a:t>
             </a:r>
             <a:r>
               <a:rPr lang="en-US" sz="1800" dirty="0">
@@ -32691,6 +32876,956 @@
         <p:cNvPr id="1" name="Shape 117">
           <a:extLst>
             <a:ext uri="{FF2B5EF4-FFF2-40B4-BE49-F238E27FC236}">
+              <a16:creationId xmlns:a16="http://schemas.microsoft.com/office/drawing/2014/main" id="{475A2408-CA67-6611-DC76-6D35EBFD34E8}"/>
+            </a:ext>
+          </a:extLst>
+        </p:cNvPr>
+        <p:cNvGrpSpPr/>
+        <p:nvPr/>
+      </p:nvGrpSpPr>
+      <p:grpSpPr>
+        <a:xfrm>
+          <a:off x="0" y="0"/>
+          <a:ext cx="0" cy="0"/>
+          <a:chOff x="0" y="0"/>
+          <a:chExt cx="0" cy="0"/>
+        </a:xfrm>
+      </p:grpSpPr>
+      <p:sp>
+        <p:nvSpPr>
+          <p:cNvPr id="118" name="Google Shape;118;p29">
+            <a:extLst>
+              <a:ext uri="{FF2B5EF4-FFF2-40B4-BE49-F238E27FC236}">
+                <a16:creationId xmlns:a16="http://schemas.microsoft.com/office/drawing/2014/main" id="{CA597ED4-1ABE-38A8-A789-503D51362E61}"/>
+              </a:ext>
+            </a:extLst>
+          </p:cNvPr>
+          <p:cNvSpPr txBox="1">
+            <a:spLocks noGrp="1"/>
+          </p:cNvSpPr>
+          <p:nvPr>
+            <p:ph type="body" idx="1"/>
+          </p:nvPr>
+        </p:nvSpPr>
+        <p:spPr>
+          <a:xfrm>
+            <a:off x="376809" y="1334279"/>
+            <a:ext cx="11177401" cy="4945509"/>
+          </a:xfrm>
+          <a:prstGeom prst="rect">
+            <a:avLst/>
+          </a:prstGeom>
+          <a:noFill/>
+          <a:ln>
+            <a:noFill/>
+          </a:ln>
+        </p:spPr>
+        <p:txBody>
+          <a:bodyPr spcFirstLastPara="1" wrap="square" lIns="91425" tIns="45700" rIns="91425" bIns="45700" anchor="t" anchorCtr="0">
+            <a:noAutofit/>
+          </a:bodyPr>
+          <a:lstStyle/>
+          <a:p>
+            <a:pPr marL="0" indent="0">
+              <a:lnSpc>
+                <a:spcPct val="100000"/>
+              </a:lnSpc>
+              <a:spcBef>
+                <a:spcPts val="0"/>
+              </a:spcBef>
+              <a:buSzPts val="3000"/>
+              <a:buNone/>
+            </a:pPr>
+            <a:r>
+              <a:rPr lang="en-US" sz="1800" dirty="0">
+                <a:latin typeface="Arial"/>
+                <a:ea typeface="Arial"/>
+                <a:cs typeface="Arial"/>
+                <a:sym typeface="Arial"/>
+              </a:rPr>
+              <a:t>Why are there 2-counter blocks?</a:t>
+            </a:r>
+          </a:p>
+          <a:p>
+            <a:pPr marL="0" indent="0">
+              <a:lnSpc>
+                <a:spcPct val="100000"/>
+              </a:lnSpc>
+              <a:spcBef>
+                <a:spcPts val="0"/>
+              </a:spcBef>
+              <a:buSzPts val="3000"/>
+              <a:buNone/>
+            </a:pPr>
+            <a:endParaRPr lang="en-US" sz="1800" dirty="0">
+              <a:latin typeface="Arial"/>
+              <a:ea typeface="Arial"/>
+              <a:cs typeface="Arial"/>
+              <a:sym typeface="Arial"/>
+            </a:endParaRPr>
+          </a:p>
+          <a:p>
+            <a:pPr marL="0" indent="0">
+              <a:lnSpc>
+                <a:spcPct val="100000"/>
+              </a:lnSpc>
+              <a:spcBef>
+                <a:spcPts val="0"/>
+              </a:spcBef>
+              <a:buSzPts val="3000"/>
+              <a:buNone/>
+            </a:pPr>
+            <a:r>
+              <a:rPr lang="en-US" sz="1800" dirty="0">
+                <a:latin typeface="Arial"/>
+                <a:ea typeface="Arial"/>
+                <a:cs typeface="Arial"/>
+                <a:sym typeface="Arial"/>
+              </a:rPr>
+              <a:t>System clock: SYSCLKOUT = 200 MHz → </a:t>
+            </a:r>
+            <a:r>
+              <a:rPr lang="en-US" sz="1800" dirty="0" err="1">
+                <a:latin typeface="Arial"/>
+                <a:ea typeface="Arial"/>
+                <a:cs typeface="Arial"/>
+                <a:sym typeface="Arial"/>
+              </a:rPr>
+              <a:t>T</a:t>
+            </a:r>
+            <a:r>
+              <a:rPr lang="en-US" sz="1800" baseline="-25000" dirty="0" err="1">
+                <a:latin typeface="Arial"/>
+                <a:ea typeface="Arial"/>
+                <a:cs typeface="Arial"/>
+                <a:sym typeface="Arial"/>
+              </a:rPr>
+              <a:t>clk</a:t>
+            </a:r>
+            <a:r>
+              <a:rPr lang="en-US" sz="1800" dirty="0">
+                <a:latin typeface="Arial"/>
+                <a:ea typeface="Arial"/>
+                <a:cs typeface="Arial"/>
+                <a:sym typeface="Arial"/>
+              </a:rPr>
+              <a:t> = 2 ns</a:t>
+            </a:r>
+          </a:p>
+          <a:p>
+            <a:pPr marL="0" indent="0">
+              <a:lnSpc>
+                <a:spcPct val="100000"/>
+              </a:lnSpc>
+              <a:spcBef>
+                <a:spcPts val="0"/>
+              </a:spcBef>
+              <a:buSzPts val="3000"/>
+              <a:buNone/>
+            </a:pPr>
+            <a:endParaRPr lang="en-US" sz="1800" baseline="-25000" dirty="0">
+              <a:latin typeface="Arial"/>
+              <a:ea typeface="Arial"/>
+              <a:cs typeface="Arial"/>
+              <a:sym typeface="Arial"/>
+            </a:endParaRPr>
+          </a:p>
+          <a:p>
+            <a:pPr marL="0" indent="0">
+              <a:lnSpc>
+                <a:spcPct val="100000"/>
+              </a:lnSpc>
+              <a:spcBef>
+                <a:spcPts val="0"/>
+              </a:spcBef>
+              <a:buSzPts val="3000"/>
+              <a:buNone/>
+            </a:pPr>
+            <a:r>
+              <a:rPr lang="en-US" sz="1800" dirty="0">
+                <a:latin typeface="Arial"/>
+                <a:ea typeface="Arial"/>
+                <a:cs typeface="Arial"/>
+                <a:sym typeface="Arial"/>
+              </a:rPr>
+              <a:t>Problem is that the clock is too fast for software:</a:t>
+            </a:r>
+          </a:p>
+          <a:p>
+            <a:pPr marL="0" indent="0">
+              <a:lnSpc>
+                <a:spcPct val="100000"/>
+              </a:lnSpc>
+              <a:spcBef>
+                <a:spcPts val="0"/>
+              </a:spcBef>
+              <a:buSzPts val="3000"/>
+              <a:buNone/>
+            </a:pPr>
+            <a:endParaRPr lang="en-US" sz="1800" dirty="0">
+              <a:latin typeface="Arial"/>
+              <a:ea typeface="Arial"/>
+              <a:cs typeface="Arial"/>
+              <a:sym typeface="Arial"/>
+            </a:endParaRPr>
+          </a:p>
+          <a:p>
+            <a:pPr marL="0" indent="0">
+              <a:lnSpc>
+                <a:spcPct val="100000"/>
+              </a:lnSpc>
+              <a:spcBef>
+                <a:spcPts val="0"/>
+              </a:spcBef>
+              <a:buSzPts val="3000"/>
+              <a:buNone/>
+            </a:pPr>
+            <a:r>
+              <a:rPr lang="en-US" sz="1800" dirty="0">
+                <a:latin typeface="Arial"/>
+                <a:ea typeface="Arial"/>
+                <a:cs typeface="Arial"/>
+                <a:sym typeface="Arial"/>
+              </a:rPr>
+              <a:t>At </a:t>
+            </a:r>
+            <a:r>
+              <a:rPr lang="en-US" sz="1800">
+                <a:latin typeface="Arial"/>
+                <a:ea typeface="Arial"/>
+                <a:cs typeface="Arial"/>
+                <a:sym typeface="Arial"/>
+              </a:rPr>
+              <a:t>200 MHz:</a:t>
+            </a:r>
+            <a:endParaRPr lang="en-US" sz="1800" dirty="0">
+              <a:latin typeface="Arial"/>
+              <a:ea typeface="Arial"/>
+              <a:cs typeface="Arial"/>
+              <a:sym typeface="Arial"/>
+            </a:endParaRPr>
+          </a:p>
+          <a:p>
+            <a:pPr marL="285750" indent="-285750">
+              <a:lnSpc>
+                <a:spcPct val="100000"/>
+              </a:lnSpc>
+              <a:spcBef>
+                <a:spcPts val="0"/>
+              </a:spcBef>
+              <a:buSzPts val="3000"/>
+            </a:pPr>
+            <a:r>
+              <a:rPr lang="en-US" sz="1800" dirty="0">
+                <a:latin typeface="Arial"/>
+                <a:ea typeface="Arial"/>
+                <a:cs typeface="Arial"/>
+                <a:sym typeface="Arial"/>
+              </a:rPr>
+              <a:t>1 </a:t>
+            </a:r>
+            <a:r>
+              <a:rPr lang="en-US" sz="1800" dirty="0" err="1">
+                <a:latin typeface="Arial"/>
+                <a:ea typeface="Arial"/>
+                <a:cs typeface="Arial"/>
+                <a:sym typeface="Arial"/>
+              </a:rPr>
+              <a:t>ms</a:t>
+            </a:r>
+            <a:r>
+              <a:rPr lang="en-US" sz="1800" dirty="0">
+                <a:latin typeface="Arial"/>
+                <a:ea typeface="Arial"/>
+                <a:cs typeface="Arial"/>
+                <a:sym typeface="Arial"/>
+              </a:rPr>
+              <a:t> requires: 200,000 clock ticks</a:t>
+            </a:r>
+          </a:p>
+          <a:p>
+            <a:pPr marL="285750" indent="-285750">
+              <a:lnSpc>
+                <a:spcPct val="100000"/>
+              </a:lnSpc>
+              <a:spcBef>
+                <a:spcPts val="0"/>
+              </a:spcBef>
+              <a:buSzPts val="3000"/>
+            </a:pPr>
+            <a:r>
+              <a:rPr lang="en-US" sz="1800" dirty="0">
+                <a:latin typeface="Arial"/>
+                <a:ea typeface="Arial"/>
+                <a:cs typeface="Arial"/>
+                <a:sym typeface="Arial"/>
+              </a:rPr>
+              <a:t>10 </a:t>
+            </a:r>
+            <a:r>
+              <a:rPr lang="en-US" sz="1800" dirty="0" err="1">
+                <a:latin typeface="Arial"/>
+                <a:ea typeface="Arial"/>
+                <a:cs typeface="Arial"/>
+                <a:sym typeface="Arial"/>
+              </a:rPr>
+              <a:t>ms</a:t>
+            </a:r>
+            <a:r>
+              <a:rPr lang="en-US" sz="1800" dirty="0">
+                <a:latin typeface="Arial"/>
+                <a:ea typeface="Arial"/>
+                <a:cs typeface="Arial"/>
+                <a:sym typeface="Arial"/>
+              </a:rPr>
+              <a:t> requires: 2,000,000 clock ticks</a:t>
+            </a:r>
+          </a:p>
+          <a:p>
+            <a:pPr marL="285750" indent="-285750">
+              <a:lnSpc>
+                <a:spcPct val="100000"/>
+              </a:lnSpc>
+              <a:spcBef>
+                <a:spcPts val="0"/>
+              </a:spcBef>
+              <a:buSzPts val="3000"/>
+            </a:pPr>
+            <a:endParaRPr lang="en-US" sz="1800" dirty="0">
+              <a:latin typeface="Arial"/>
+              <a:ea typeface="Arial"/>
+              <a:cs typeface="Arial"/>
+              <a:sym typeface="Arial"/>
+            </a:endParaRPr>
+          </a:p>
+          <a:p>
+            <a:pPr marL="0" indent="0">
+              <a:lnSpc>
+                <a:spcPct val="100000"/>
+              </a:lnSpc>
+              <a:spcBef>
+                <a:spcPts val="0"/>
+              </a:spcBef>
+              <a:buSzPts val="3000"/>
+              <a:buNone/>
+            </a:pPr>
+            <a:r>
+              <a:rPr lang="en-US" sz="1800" dirty="0">
+                <a:latin typeface="Arial"/>
+                <a:ea typeface="Arial"/>
+                <a:cs typeface="Arial"/>
+                <a:sym typeface="Arial"/>
+              </a:rPr>
+              <a:t>Split the job into 2 counters:</a:t>
+            </a:r>
+          </a:p>
+          <a:p>
+            <a:pPr marL="285750" indent="-285750">
+              <a:lnSpc>
+                <a:spcPct val="100000"/>
+              </a:lnSpc>
+              <a:spcBef>
+                <a:spcPts val="0"/>
+              </a:spcBef>
+              <a:buSzPts val="3000"/>
+            </a:pPr>
+            <a:r>
+              <a:rPr lang="en-US" sz="1800" dirty="0" err="1">
+                <a:latin typeface="Arial"/>
+                <a:ea typeface="Arial"/>
+                <a:cs typeface="Arial"/>
+                <a:sym typeface="Arial"/>
+              </a:rPr>
+              <a:t>Prescaler</a:t>
+            </a:r>
+            <a:r>
+              <a:rPr lang="en-US" sz="1800" dirty="0">
+                <a:latin typeface="Arial"/>
+                <a:ea typeface="Arial"/>
+                <a:cs typeface="Arial"/>
+                <a:sym typeface="Arial"/>
+              </a:rPr>
+              <a:t> Counter (PSC, TDDR) – Controls speed, defines a unit of time</a:t>
+            </a:r>
+          </a:p>
+          <a:p>
+            <a:pPr marL="285750" indent="-285750">
+              <a:lnSpc>
+                <a:spcPct val="100000"/>
+              </a:lnSpc>
+              <a:spcBef>
+                <a:spcPts val="0"/>
+              </a:spcBef>
+              <a:buSzPts val="3000"/>
+            </a:pPr>
+            <a:r>
+              <a:rPr lang="en-US" sz="1800" dirty="0">
+                <a:latin typeface="Arial"/>
+                <a:ea typeface="Arial"/>
+                <a:cs typeface="Arial"/>
+                <a:sym typeface="Arial"/>
+              </a:rPr>
+              <a:t>Main Timer Counter (TIM, PRD) – Controls duration, how much time should pass</a:t>
+            </a:r>
+          </a:p>
+          <a:p>
+            <a:pPr marL="285750" indent="-285750">
+              <a:lnSpc>
+                <a:spcPct val="100000"/>
+              </a:lnSpc>
+              <a:spcBef>
+                <a:spcPts val="0"/>
+              </a:spcBef>
+              <a:buSzPts val="3000"/>
+            </a:pPr>
+            <a:endParaRPr lang="en-US" sz="1800" dirty="0">
+              <a:latin typeface="Arial"/>
+              <a:ea typeface="Arial"/>
+              <a:cs typeface="Arial"/>
+              <a:sym typeface="Arial"/>
+            </a:endParaRPr>
+          </a:p>
+          <a:p>
+            <a:pPr marL="0" indent="0">
+              <a:lnSpc>
+                <a:spcPct val="100000"/>
+              </a:lnSpc>
+              <a:spcBef>
+                <a:spcPts val="0"/>
+              </a:spcBef>
+              <a:buSzPts val="3000"/>
+              <a:buNone/>
+            </a:pPr>
+            <a:r>
+              <a:rPr lang="en-US" sz="1800" dirty="0">
+                <a:latin typeface="Arial"/>
+                <a:ea typeface="Arial"/>
+                <a:cs typeface="Arial"/>
+                <a:sym typeface="Arial"/>
+              </a:rPr>
+              <a:t>One counter decides how </a:t>
+            </a:r>
+            <a:r>
+              <a:rPr lang="en-US" sz="1800" i="1" dirty="0">
+                <a:latin typeface="Arial"/>
+                <a:ea typeface="Arial"/>
+                <a:cs typeface="Arial"/>
+                <a:sym typeface="Arial"/>
+              </a:rPr>
+              <a:t>fast time flows </a:t>
+            </a:r>
+            <a:r>
+              <a:rPr lang="en-US" sz="1800" dirty="0">
+                <a:latin typeface="Arial"/>
+                <a:ea typeface="Arial"/>
+                <a:cs typeface="Arial"/>
+                <a:sym typeface="Arial"/>
+              </a:rPr>
+              <a:t>and the other decides </a:t>
+            </a:r>
+            <a:r>
+              <a:rPr lang="en-US" sz="1800" i="1" dirty="0">
+                <a:latin typeface="Arial"/>
+                <a:ea typeface="Arial"/>
+                <a:cs typeface="Arial"/>
+                <a:sym typeface="Arial"/>
+              </a:rPr>
+              <a:t>how much time passes.</a:t>
+            </a:r>
+          </a:p>
+          <a:p>
+            <a:pPr marL="0" indent="0">
+              <a:lnSpc>
+                <a:spcPct val="100000"/>
+              </a:lnSpc>
+              <a:spcBef>
+                <a:spcPts val="0"/>
+              </a:spcBef>
+              <a:buSzPts val="3000"/>
+              <a:buNone/>
+            </a:pPr>
+            <a:endParaRPr lang="en-US" sz="1800" i="1" dirty="0">
+              <a:latin typeface="Arial"/>
+              <a:ea typeface="Arial"/>
+              <a:cs typeface="Arial"/>
+              <a:sym typeface="Arial"/>
+            </a:endParaRPr>
+          </a:p>
+          <a:p>
+            <a:pPr marL="0" indent="0">
+              <a:lnSpc>
+                <a:spcPct val="100000"/>
+              </a:lnSpc>
+              <a:spcBef>
+                <a:spcPts val="0"/>
+              </a:spcBef>
+              <a:buSzPts val="3000"/>
+              <a:buNone/>
+            </a:pPr>
+            <a:r>
+              <a:rPr lang="en-US" sz="1800" dirty="0">
+                <a:latin typeface="Arial"/>
+                <a:ea typeface="Arial"/>
+                <a:cs typeface="Arial"/>
+                <a:sym typeface="Arial"/>
+              </a:rPr>
+              <a:t>With a </a:t>
+            </a:r>
+            <a:r>
+              <a:rPr lang="en-US" sz="1800" dirty="0" err="1">
+                <a:latin typeface="Arial"/>
+                <a:ea typeface="Arial"/>
+                <a:cs typeface="Arial"/>
+                <a:sym typeface="Arial"/>
+              </a:rPr>
+              <a:t>prescaler</a:t>
+            </a:r>
+            <a:r>
+              <a:rPr lang="en-US" sz="1800" dirty="0">
+                <a:latin typeface="Arial"/>
+                <a:ea typeface="Arial"/>
+                <a:cs typeface="Arial"/>
+                <a:sym typeface="Arial"/>
+              </a:rPr>
+              <a:t> set to TTDR=199 for example, you now have that a single tick for the main timer counter represents a clean 1 </a:t>
+            </a:r>
+            <a:r>
+              <a:rPr lang="el-GR" sz="1800" dirty="0"/>
+              <a:t>μ</a:t>
+            </a:r>
+            <a:r>
+              <a:rPr lang="en-US" sz="1800" dirty="0"/>
+              <a:t>s, thus to ensure that your timer runs every 10 </a:t>
+            </a:r>
+            <a:r>
+              <a:rPr lang="en-US" sz="1800" dirty="0" err="1"/>
+              <a:t>ms</a:t>
+            </a:r>
+            <a:r>
+              <a:rPr lang="en-US" sz="1800" dirty="0"/>
+              <a:t> you can set PRD = 10,000! Much simpler! </a:t>
+            </a:r>
+            <a:endParaRPr lang="en-US" sz="1800" dirty="0">
+              <a:latin typeface="Arial"/>
+              <a:ea typeface="Arial"/>
+              <a:cs typeface="Arial"/>
+              <a:sym typeface="Arial"/>
+            </a:endParaRPr>
+          </a:p>
+        </p:txBody>
+      </p:sp>
+      <p:sp>
+        <p:nvSpPr>
+          <p:cNvPr id="119" name="Google Shape;119;p29">
+            <a:extLst>
+              <a:ext uri="{FF2B5EF4-FFF2-40B4-BE49-F238E27FC236}">
+                <a16:creationId xmlns:a16="http://schemas.microsoft.com/office/drawing/2014/main" id="{AAC30045-7CC0-39F9-973B-6A9ACB445D45}"/>
+              </a:ext>
+            </a:extLst>
+          </p:cNvPr>
+          <p:cNvSpPr/>
+          <p:nvPr/>
+        </p:nvSpPr>
+        <p:spPr>
+          <a:xfrm rot="10800000" flipH="1">
+            <a:off x="0" y="0"/>
+            <a:ext cx="12192000" cy="868220"/>
+          </a:xfrm>
+          <a:prstGeom prst="rect">
+            <a:avLst/>
+          </a:prstGeom>
+          <a:solidFill>
+            <a:srgbClr val="13294B"/>
+          </a:solidFill>
+          <a:ln>
+            <a:noFill/>
+          </a:ln>
+        </p:spPr>
+        <p:txBody>
+          <a:bodyPr spcFirstLastPara="1" wrap="square" lIns="91425" tIns="45700" rIns="91425" bIns="45700" anchor="ctr" anchorCtr="0">
+            <a:noAutofit/>
+          </a:bodyPr>
+          <a:lstStyle/>
+          <a:p>
+            <a:pPr marL="0" marR="0" lvl="0" indent="0" algn="ctr" rtl="0">
+              <a:lnSpc>
+                <a:spcPct val="100000"/>
+              </a:lnSpc>
+              <a:spcBef>
+                <a:spcPts val="0"/>
+              </a:spcBef>
+              <a:spcAft>
+                <a:spcPts val="0"/>
+              </a:spcAft>
+              <a:buClr>
+                <a:schemeClr val="lt1"/>
+              </a:buClr>
+              <a:buSzPts val="1800"/>
+              <a:buFont typeface="Calibri"/>
+              <a:buNone/>
+            </a:pPr>
+            <a:endParaRPr sz="1800" b="0" i="0" u="none" strike="noStrike" cap="none">
+              <a:solidFill>
+                <a:srgbClr val="13294B"/>
+              </a:solidFill>
+              <a:latin typeface="Calibri"/>
+              <a:ea typeface="Calibri"/>
+              <a:cs typeface="Calibri"/>
+              <a:sym typeface="Calibri"/>
+            </a:endParaRPr>
+          </a:p>
+        </p:txBody>
+      </p:sp>
+      <p:sp>
+        <p:nvSpPr>
+          <p:cNvPr id="120" name="Google Shape;120;p29">
+            <a:extLst>
+              <a:ext uri="{FF2B5EF4-FFF2-40B4-BE49-F238E27FC236}">
+                <a16:creationId xmlns:a16="http://schemas.microsoft.com/office/drawing/2014/main" id="{31CF0951-1B3E-B309-4F20-4E19E396BACC}"/>
+              </a:ext>
+            </a:extLst>
+          </p:cNvPr>
+          <p:cNvSpPr txBox="1"/>
+          <p:nvPr/>
+        </p:nvSpPr>
+        <p:spPr>
+          <a:xfrm>
+            <a:off x="376810" y="204051"/>
+            <a:ext cx="10910026" cy="461624"/>
+          </a:xfrm>
+          <a:prstGeom prst="rect">
+            <a:avLst/>
+          </a:prstGeom>
+          <a:noFill/>
+          <a:ln>
+            <a:noFill/>
+          </a:ln>
+        </p:spPr>
+        <p:txBody>
+          <a:bodyPr spcFirstLastPara="1" wrap="square" lIns="91425" tIns="45700" rIns="91425" bIns="45700" anchor="t" anchorCtr="0">
+            <a:spAutoFit/>
+          </a:bodyPr>
+          <a:lstStyle/>
+          <a:p>
+            <a:pPr marL="0" marR="0" lvl="0" indent="0" algn="l" rtl="0">
+              <a:lnSpc>
+                <a:spcPct val="100000"/>
+              </a:lnSpc>
+              <a:spcBef>
+                <a:spcPts val="0"/>
+              </a:spcBef>
+              <a:spcAft>
+                <a:spcPts val="0"/>
+              </a:spcAft>
+              <a:buClr>
+                <a:srgbClr val="000000"/>
+              </a:buClr>
+              <a:buSzPts val="2400"/>
+              <a:buFont typeface="Arial"/>
+              <a:buNone/>
+            </a:pPr>
+            <a:r>
+              <a:rPr lang="en-US" sz="2400" b="0" i="0" u="none" strike="noStrike" cap="none" dirty="0">
+                <a:solidFill>
+                  <a:schemeClr val="lt1"/>
+                </a:solidFill>
+                <a:latin typeface="Arial"/>
+                <a:ea typeface="Arial"/>
+                <a:cs typeface="Arial"/>
+                <a:sym typeface="Arial"/>
+              </a:rPr>
+              <a:t>What is a timer?</a:t>
+            </a:r>
+            <a:endParaRPr sz="2400" b="0" i="0" u="none" strike="noStrike" cap="none" dirty="0">
+              <a:solidFill>
+                <a:schemeClr val="lt1"/>
+              </a:solidFill>
+              <a:latin typeface="Arial"/>
+              <a:ea typeface="Arial"/>
+              <a:cs typeface="Arial"/>
+              <a:sym typeface="Arial"/>
+            </a:endParaRPr>
+          </a:p>
+        </p:txBody>
+      </p:sp>
+      <p:pic>
+        <p:nvPicPr>
+          <p:cNvPr id="121" name="Google Shape;121;p29">
+            <a:extLst>
+              <a:ext uri="{FF2B5EF4-FFF2-40B4-BE49-F238E27FC236}">
+                <a16:creationId xmlns:a16="http://schemas.microsoft.com/office/drawing/2014/main" id="{94816700-3D02-C248-14E0-D7385ECBA363}"/>
+              </a:ext>
+            </a:extLst>
+          </p:cNvPr>
+          <p:cNvPicPr preferRelativeResize="0"/>
+          <p:nvPr/>
+        </p:nvPicPr>
+        <p:blipFill rotWithShape="1">
+          <a:blip r:embed="rId3">
+            <a:alphaModFix/>
+          </a:blip>
+          <a:srcRect/>
+          <a:stretch/>
+        </p:blipFill>
+        <p:spPr>
+          <a:xfrm>
+            <a:off x="11557509" y="233819"/>
+            <a:ext cx="271308" cy="389810"/>
+          </a:xfrm>
+          <a:prstGeom prst="rect">
+            <a:avLst/>
+          </a:prstGeom>
+          <a:noFill/>
+          <a:ln>
+            <a:noFill/>
+          </a:ln>
+        </p:spPr>
+      </p:pic>
+      <p:sp>
+        <p:nvSpPr>
+          <p:cNvPr id="122" name="Google Shape;122;p29">
+            <a:extLst>
+              <a:ext uri="{FF2B5EF4-FFF2-40B4-BE49-F238E27FC236}">
+                <a16:creationId xmlns:a16="http://schemas.microsoft.com/office/drawing/2014/main" id="{4298E33C-250B-E218-DEC7-5D52D056BC70}"/>
+              </a:ext>
+            </a:extLst>
+          </p:cNvPr>
+          <p:cNvSpPr txBox="1"/>
+          <p:nvPr/>
+        </p:nvSpPr>
+        <p:spPr>
+          <a:xfrm>
+            <a:off x="9335597" y="6524381"/>
+            <a:ext cx="2473415" cy="230792"/>
+          </a:xfrm>
+          <a:prstGeom prst="rect">
+            <a:avLst/>
+          </a:prstGeom>
+          <a:noFill/>
+          <a:ln>
+            <a:noFill/>
+          </a:ln>
+        </p:spPr>
+        <p:txBody>
+          <a:bodyPr spcFirstLastPara="1" wrap="square" lIns="91425" tIns="45700" rIns="91425" bIns="45700" anchor="t" anchorCtr="0">
+            <a:spAutoFit/>
+          </a:bodyPr>
+          <a:lstStyle/>
+          <a:p>
+            <a:pPr marL="0" marR="0" lvl="0" indent="0" algn="r" rtl="0">
+              <a:lnSpc>
+                <a:spcPct val="100000"/>
+              </a:lnSpc>
+              <a:spcBef>
+                <a:spcPts val="0"/>
+              </a:spcBef>
+              <a:spcAft>
+                <a:spcPts val="0"/>
+              </a:spcAft>
+              <a:buNone/>
+            </a:pPr>
+            <a:r>
+              <a:rPr lang="en-US" sz="900" b="0" i="0" u="none" strike="noStrike" cap="none">
+                <a:solidFill>
+                  <a:srgbClr val="13294B"/>
+                </a:solidFill>
+                <a:latin typeface="Arial"/>
+                <a:ea typeface="Arial"/>
+                <a:cs typeface="Arial"/>
+                <a:sym typeface="Arial"/>
+              </a:rPr>
+              <a:t>GRAINGER ENGINEERING</a:t>
+            </a:r>
+            <a:endParaRPr/>
+          </a:p>
+        </p:txBody>
+      </p:sp>
+      <p:sp>
+        <p:nvSpPr>
+          <p:cNvPr id="123" name="Google Shape;123;p29">
+            <a:extLst>
+              <a:ext uri="{FF2B5EF4-FFF2-40B4-BE49-F238E27FC236}">
+                <a16:creationId xmlns:a16="http://schemas.microsoft.com/office/drawing/2014/main" id="{C4E87641-7FC6-BF33-B11A-0D730B882F90}"/>
+              </a:ext>
+            </a:extLst>
+          </p:cNvPr>
+          <p:cNvSpPr txBox="1"/>
+          <p:nvPr/>
+        </p:nvSpPr>
+        <p:spPr>
+          <a:xfrm>
+            <a:off x="376807" y="6524381"/>
+            <a:ext cx="7991337" cy="230792"/>
+          </a:xfrm>
+          <a:prstGeom prst="rect">
+            <a:avLst/>
+          </a:prstGeom>
+          <a:noFill/>
+          <a:ln>
+            <a:noFill/>
+          </a:ln>
+        </p:spPr>
+        <p:txBody>
+          <a:bodyPr spcFirstLastPara="1" wrap="square" lIns="91425" tIns="45700" rIns="91425" bIns="45700" anchor="t" anchorCtr="0">
+            <a:spAutoFit/>
+          </a:bodyPr>
+          <a:lstStyle/>
+          <a:p>
+            <a:pPr marL="0" marR="0" lvl="0" indent="0" algn="l" rtl="0">
+              <a:lnSpc>
+                <a:spcPct val="100000"/>
+              </a:lnSpc>
+              <a:spcBef>
+                <a:spcPts val="0"/>
+              </a:spcBef>
+              <a:spcAft>
+                <a:spcPts val="0"/>
+              </a:spcAft>
+              <a:buNone/>
+            </a:pPr>
+            <a:r>
+              <a:rPr lang="en-US" sz="900" dirty="0">
+                <a:solidFill>
+                  <a:srgbClr val="13294B"/>
+                </a:solidFill>
+              </a:rPr>
+              <a:t>SYSTEMS ENGINEERING </a:t>
+            </a:r>
+            <a:endParaRPr dirty="0"/>
+          </a:p>
+        </p:txBody>
+      </p:sp>
+      <p:grpSp>
+        <p:nvGrpSpPr>
+          <p:cNvPr id="124" name="Google Shape;124;p29">
+            <a:extLst>
+              <a:ext uri="{FF2B5EF4-FFF2-40B4-BE49-F238E27FC236}">
+                <a16:creationId xmlns:a16="http://schemas.microsoft.com/office/drawing/2014/main" id="{6DA1D7C8-BB2D-E37E-636E-05687647DBD0}"/>
+              </a:ext>
+            </a:extLst>
+          </p:cNvPr>
+          <p:cNvGrpSpPr/>
+          <p:nvPr/>
+        </p:nvGrpSpPr>
+        <p:grpSpPr>
+          <a:xfrm>
+            <a:off x="4066674" y="6601537"/>
+            <a:ext cx="5233412" cy="70446"/>
+            <a:chOff x="4033424" y="6601537"/>
+            <a:chExt cx="5233412" cy="70446"/>
+          </a:xfrm>
+        </p:grpSpPr>
+        <p:cxnSp>
+          <p:nvCxnSpPr>
+            <p:cNvPr id="125" name="Google Shape;125;p29">
+              <a:extLst>
+                <a:ext uri="{FF2B5EF4-FFF2-40B4-BE49-F238E27FC236}">
+                  <a16:creationId xmlns:a16="http://schemas.microsoft.com/office/drawing/2014/main" id="{F5443457-B9B5-8D6F-6CBB-732513501BBA}"/>
+                </a:ext>
+              </a:extLst>
+            </p:cNvPr>
+            <p:cNvCxnSpPr/>
+            <p:nvPr/>
+          </p:nvCxnSpPr>
+          <p:spPr>
+            <a:xfrm rot="10800000">
+              <a:off x="4033424" y="6639606"/>
+              <a:ext cx="5164651" cy="0"/>
+            </a:xfrm>
+            <a:prstGeom prst="straightConnector1">
+              <a:avLst/>
+            </a:prstGeom>
+            <a:noFill/>
+            <a:ln w="9525" cap="flat" cmpd="sng">
+              <a:solidFill>
+                <a:srgbClr val="13294B"/>
+              </a:solidFill>
+              <a:prstDash val="solid"/>
+              <a:round/>
+              <a:headEnd type="none" w="sm" len="sm"/>
+              <a:tailEnd type="none" w="sm" len="sm"/>
+            </a:ln>
+          </p:spPr>
+        </p:cxnSp>
+        <p:sp>
+          <p:nvSpPr>
+            <p:cNvPr id="126" name="Google Shape;126;p29">
+              <a:extLst>
+                <a:ext uri="{FF2B5EF4-FFF2-40B4-BE49-F238E27FC236}">
+                  <a16:creationId xmlns:a16="http://schemas.microsoft.com/office/drawing/2014/main" id="{0FAC64C2-1ED3-D0D3-BDF8-D3D9711A180D}"/>
+                </a:ext>
+              </a:extLst>
+            </p:cNvPr>
+            <p:cNvSpPr/>
+            <p:nvPr/>
+          </p:nvSpPr>
+          <p:spPr>
+            <a:xfrm>
+              <a:off x="9196390" y="6601537"/>
+              <a:ext cx="70446" cy="70446"/>
+            </a:xfrm>
+            <a:prstGeom prst="ellipse">
+              <a:avLst/>
+            </a:prstGeom>
+            <a:solidFill>
+              <a:srgbClr val="13294B"/>
+            </a:solidFill>
+            <a:ln>
+              <a:noFill/>
+            </a:ln>
+          </p:spPr>
+          <p:txBody>
+            <a:bodyPr spcFirstLastPara="1" wrap="square" lIns="91425" tIns="45700" rIns="91425" bIns="45700" anchor="ctr" anchorCtr="0">
+              <a:noAutofit/>
+            </a:bodyPr>
+            <a:lstStyle/>
+            <a:p>
+              <a:pPr marL="0" marR="0" lvl="0" indent="0" algn="ctr" rtl="0">
+                <a:lnSpc>
+                  <a:spcPct val="100000"/>
+                </a:lnSpc>
+                <a:spcBef>
+                  <a:spcPts val="0"/>
+                </a:spcBef>
+                <a:spcAft>
+                  <a:spcPts val="0"/>
+                </a:spcAft>
+                <a:buNone/>
+              </a:pPr>
+              <a:endParaRPr sz="1400" b="0" i="0" u="none" strike="noStrike" cap="none">
+                <a:solidFill>
+                  <a:srgbClr val="13294B"/>
+                </a:solidFill>
+                <a:latin typeface="Arial"/>
+                <a:ea typeface="Arial"/>
+                <a:cs typeface="Arial"/>
+                <a:sym typeface="Arial"/>
+              </a:endParaRPr>
+            </a:p>
+          </p:txBody>
+        </p:sp>
+      </p:grpSp>
+    </p:spTree>
+    <p:extLst>
+      <p:ext uri="{BB962C8B-B14F-4D97-AF65-F5344CB8AC3E}">
+        <p14:creationId xmlns:p14="http://schemas.microsoft.com/office/powerpoint/2010/main" val="2020115831"/>
+      </p:ext>
+    </p:extLst>
+  </p:cSld>
+  <p:clrMapOvr>
+    <a:masterClrMapping/>
+  </p:clrMapOvr>
+</p:sld>
+</file>
+
+<file path=ppt/slides/slide26.xml><?xml version="1.0" encoding="utf-8"?>
+<p:sld xmlns:a="http://schemas.openxmlformats.org/drawingml/2006/main" xmlns:r="http://schemas.openxmlformats.org/officeDocument/2006/relationships" xmlns:p="http://schemas.openxmlformats.org/presentationml/2006/main">
+  <p:cSld>
+    <p:spTree>
+      <p:nvGrpSpPr>
+        <p:cNvPr id="1" name="Shape 117">
+          <a:extLst>
+            <a:ext uri="{FF2B5EF4-FFF2-40B4-BE49-F238E27FC236}">
               <a16:creationId xmlns:a16="http://schemas.microsoft.com/office/drawing/2014/main" id="{4953FF48-2567-36DF-0E08-872F3456FEED}"/>
             </a:ext>
           </a:extLst>
@@ -33146,7 +34281,7 @@
 </p:sld>
 </file>
 
-<file path=ppt/slides/slide26.xml><?xml version="1.0" encoding="utf-8"?>
+<file path=ppt/slides/slide27.xml><?xml version="1.0" encoding="utf-8"?>
 <p:sld xmlns:a="http://schemas.openxmlformats.org/drawingml/2006/main" xmlns:r="http://schemas.openxmlformats.org/officeDocument/2006/relationships" xmlns:p="http://schemas.openxmlformats.org/presentationml/2006/main">
   <p:cSld>
     <p:spTree>
@@ -33938,7 +35073,7 @@
 </p:sld>
 </file>
 
-<file path=ppt/slides/slide27.xml><?xml version="1.0" encoding="utf-8"?>
+<file path=ppt/slides/slide28.xml><?xml version="1.0" encoding="utf-8"?>
 <p:sld xmlns:a="http://schemas.openxmlformats.org/drawingml/2006/main" xmlns:r="http://schemas.openxmlformats.org/officeDocument/2006/relationships" xmlns:p="http://schemas.openxmlformats.org/presentationml/2006/main">
   <p:cSld>
     <p:bg>
@@ -34253,7 +35388,7 @@
 </p:sld>
 </file>
 
-<file path=ppt/slides/slide28.xml><?xml version="1.0" encoding="utf-8"?>
+<file path=ppt/slides/slide29.xml><?xml version="1.0" encoding="utf-8"?>
 <p:sld xmlns:a="http://schemas.openxmlformats.org/drawingml/2006/main" xmlns:r="http://schemas.openxmlformats.org/officeDocument/2006/relationships" xmlns:p="http://schemas.openxmlformats.org/presentationml/2006/main">
   <p:cSld>
     <p:bg>

</xml_diff>

<commit_message>
updated date on slide
</commit_message>
<xml_diff>
--- a/Lectures/Slides/L2.pptx
+++ b/Lectures/Slides/L2.pptx
@@ -274,7 +274,7 @@
       <p15:sldGuideLst xmlns:p15="http://schemas.microsoft.com/office/powerpoint/2012/main"/>
     </p:ext>
     <p:ext uri="http://customooxmlschemas.google.com/">
-      <go:slidesCustomData xmlns="" xmlns:mc="http://schemas.openxmlformats.org/markup-compatibility/2006" xmlns:mv="urn:schemas-microsoft-com:mac:vml" xmlns:c="http://schemas.openxmlformats.org/drawingml/2006/chart" xmlns:dgm="http://schemas.openxmlformats.org/drawingml/2006/diagram" xmlns:o="urn:schemas-microsoft-com:office:office" xmlns:v="urn:schemas-microsoft-com:vml" xmlns:pvml="urn:schemas-microsoft-com:office:powerpoint" xmlns:com="http://schemas.openxmlformats.org/drawingml/2006/compatibility" xmlns:p14="http://schemas.microsoft.com/office/powerpoint/2010/main" xmlns:p15="http://schemas.microsoft.com/office/powerpoint/2012/main" xmlns:ahyp="http://schemas.microsoft.com/office/drawing/2018/hyperlinkcolor" xmlns:go="http://customooxmlschemas.google.com/" r:id="rId32" roundtripDataSignature="AMtx7mjKkk5wOoQj6sDPPETbbKgHU96Dzg=="/>
+      <go:slidesCustomData xmlns:go="http://customooxmlschemas.google.com/" xmlns:ahyp="http://schemas.microsoft.com/office/drawing/2018/hyperlinkcolor" xmlns:p15="http://schemas.microsoft.com/office/powerpoint/2012/main" xmlns:p14="http://schemas.microsoft.com/office/powerpoint/2010/main" xmlns:com="http://schemas.openxmlformats.org/drawingml/2006/compatibility" xmlns:pvml="urn:schemas-microsoft-com:office:powerpoint" xmlns:v="urn:schemas-microsoft-com:vml" xmlns:o="urn:schemas-microsoft-com:office:office" xmlns:dgm="http://schemas.openxmlformats.org/drawingml/2006/diagram" xmlns:c="http://schemas.openxmlformats.org/drawingml/2006/chart" xmlns:mv="urn:schemas-microsoft-com:mac:vml" xmlns:mc="http://schemas.openxmlformats.org/markup-compatibility/2006" xmlns="" r:id="rId32" roundtripDataSignature="AMtx7mjKkk5wOoQj6sDPPETbbKgHU96Dzg=="/>
     </p:ext>
   </p:extLst>
 </p:presentation>
@@ -19472,7 +19472,7 @@
                 <a:cs typeface="Arial"/>
                 <a:sym typeface="Arial"/>
               </a:rPr>
-              <a:t>Monday</a:t>
+              <a:t>Monday 26, 2026</a:t>
             </a:r>
             <a:endParaRPr sz="1800" b="0" i="0" u="none" strike="noStrike" cap="none" dirty="0">
               <a:solidFill>
@@ -33087,23 +33087,8 @@
                 <a:cs typeface="Arial"/>
                 <a:sym typeface="Arial"/>
               </a:rPr>
-              <a:t>At </a:t>
-            </a:r>
-            <a:r>
-              <a:rPr lang="en-US" sz="1800">
-                <a:latin typeface="Arial"/>
-                <a:ea typeface="Arial"/>
-                <a:cs typeface="Arial"/>
-                <a:sym typeface="Arial"/>
-              </a:rPr>
-              <a:t>200 MHz:</a:t>
-            </a:r>
-            <a:endParaRPr lang="en-US" sz="1800" dirty="0">
-              <a:latin typeface="Arial"/>
-              <a:ea typeface="Arial"/>
-              <a:cs typeface="Arial"/>
-              <a:sym typeface="Arial"/>
-            </a:endParaRPr>
+              <a:t>At 200 MHz:</a:t>
+            </a:r>
           </a:p>
           <a:p>
             <a:pPr marL="285750" indent="-285750">
@@ -33395,7 +33380,7 @@
             </a:r>
             <a:r>
               <a:rPr lang="en-US" sz="1800" dirty="0"/>
-              <a:t>s, thus to ensure that your timer runs every 10 </a:t>
+              <a:t>s, thus, to ensure that your timer runs every 10 </a:t>
             </a:r>
             <a:r>
               <a:rPr lang="en-US" sz="1800" dirty="0" err="1"/>

</xml_diff>

<commit_message>
minor lecture 2 update
</commit_message>
<xml_diff>
--- a/Lectures/Slides/L2.pptx
+++ b/Lectures/Slides/L2.pptx
@@ -274,7 +274,7 @@
       <p15:sldGuideLst xmlns:p15="http://schemas.microsoft.com/office/powerpoint/2012/main"/>
     </p:ext>
     <p:ext uri="http://customooxmlschemas.google.com/">
-      <go:slidesCustomData xmlns:go="http://customooxmlschemas.google.com/" xmlns:ahyp="http://schemas.microsoft.com/office/drawing/2018/hyperlinkcolor" xmlns:p15="http://schemas.microsoft.com/office/powerpoint/2012/main" xmlns:p14="http://schemas.microsoft.com/office/powerpoint/2010/main" xmlns:com="http://schemas.openxmlformats.org/drawingml/2006/compatibility" xmlns:pvml="urn:schemas-microsoft-com:office:powerpoint" xmlns:v="urn:schemas-microsoft-com:vml" xmlns:o="urn:schemas-microsoft-com:office:office" xmlns:dgm="http://schemas.openxmlformats.org/drawingml/2006/diagram" xmlns:c="http://schemas.openxmlformats.org/drawingml/2006/chart" xmlns:mv="urn:schemas-microsoft-com:mac:vml" xmlns:mc="http://schemas.openxmlformats.org/markup-compatibility/2006" xmlns="" r:id="rId32" roundtripDataSignature="AMtx7mjKkk5wOoQj6sDPPETbbKgHU96Dzg=="/>
+      <go:slidesCustomData xmlns="" xmlns:mc="http://schemas.openxmlformats.org/markup-compatibility/2006" xmlns:mv="urn:schemas-microsoft-com:mac:vml" xmlns:c="http://schemas.openxmlformats.org/drawingml/2006/chart" xmlns:dgm="http://schemas.openxmlformats.org/drawingml/2006/diagram" xmlns:o="urn:schemas-microsoft-com:office:office" xmlns:v="urn:schemas-microsoft-com:vml" xmlns:pvml="urn:schemas-microsoft-com:office:powerpoint" xmlns:com="http://schemas.openxmlformats.org/drawingml/2006/compatibility" xmlns:p14="http://schemas.microsoft.com/office/powerpoint/2010/main" xmlns:p15="http://schemas.microsoft.com/office/powerpoint/2012/main" xmlns:ahyp="http://schemas.microsoft.com/office/drawing/2018/hyperlinkcolor" xmlns:go="http://customooxmlschemas.google.com/" r:id="rId32" roundtripDataSignature="AMtx7mjKkk5wOoQj6sDPPETbbKgHU96Dzg=="/>
     </p:ext>
   </p:extLst>
 </p:presentation>
@@ -28405,14 +28405,7 @@
             </a:r>
           </a:p>
           <a:p>
-            <a:pPr marL="0" indent="0">
-              <a:lnSpc>
-                <a:spcPct val="100000"/>
-              </a:lnSpc>
-              <a:spcBef>
-                <a:spcPts val="0"/>
-              </a:spcBef>
-              <a:buSzPts val="3000"/>
+            <a:pPr marL="114300" indent="0" algn="l">
               <a:buNone/>
             </a:pPr>
             <a:endParaRPr lang="en-US" sz="1800" b="1" dirty="0">
@@ -28420,7 +28413,6 @@
                 <a:srgbClr val="15264B"/>
               </a:solidFill>
               <a:latin typeface="Arial"/>
-              <a:ea typeface="Arial"/>
               <a:cs typeface="Arial"/>
               <a:sym typeface="Arial"/>
             </a:endParaRPr>

</xml_diff>